<commit_message>
Added conclusion & future scope
</commit_message>
<xml_diff>
--- a/IBM_CapstoneProject.pptx
+++ b/IBM_CapstoneProject.pptx
@@ -13,11 +13,12 @@
     <p:sldId id="263" r:id="rId7"/>
     <p:sldId id="264" r:id="rId8"/>
     <p:sldId id="265" r:id="rId9"/>
-    <p:sldId id="267" r:id="rId10"/>
-    <p:sldId id="266" r:id="rId11"/>
-    <p:sldId id="268" r:id="rId12"/>
-    <p:sldId id="269" r:id="rId13"/>
-    <p:sldId id="270" r:id="rId14"/>
+    <p:sldId id="266" r:id="rId10"/>
+    <p:sldId id="268" r:id="rId11"/>
+    <p:sldId id="269" r:id="rId12"/>
+    <p:sldId id="270" r:id="rId13"/>
+    <p:sldId id="271" r:id="rId14"/>
+    <p:sldId id="272" r:id="rId15"/>
   </p:sldIdLst>
   <p:sldSz cx="12192000" cy="6858000"/>
   <p:notesSz cx="6858000" cy="9144000"/>
@@ -4037,94 +4038,6 @@
           <p:cNvPr id="2" name="Title 1">
             <a:extLst>
               <a:ext uri="{FF2B5EF4-FFF2-40B4-BE49-F238E27FC236}">
-                <a16:creationId xmlns:a16="http://schemas.microsoft.com/office/drawing/2014/main" id="{2074BD20-C9C5-4E61-879C-43C2B681A8E5}"/>
-              </a:ext>
-            </a:extLst>
-          </p:cNvPr>
-          <p:cNvSpPr>
-            <a:spLocks noGrp="1"/>
-          </p:cNvSpPr>
-          <p:nvPr>
-            <p:ph type="title"/>
-          </p:nvPr>
-        </p:nvSpPr>
-        <p:spPr/>
-        <p:txBody>
-          <a:bodyPr/>
-          <a:lstStyle/>
-          <a:p>
-            <a:r>
-              <a:rPr lang="en-US" dirty="0"/>
-              <a:t>Data Visualization</a:t>
-            </a:r>
-          </a:p>
-        </p:txBody>
-      </p:sp>
-      <p:pic>
-        <p:nvPicPr>
-          <p:cNvPr id="4" name="Picture 3">
-            <a:extLst>
-              <a:ext uri="{FF2B5EF4-FFF2-40B4-BE49-F238E27FC236}">
-                <a16:creationId xmlns:a16="http://schemas.microsoft.com/office/drawing/2014/main" id="{E47BB1ED-014F-4E02-B58B-841EA6A490C4}"/>
-              </a:ext>
-            </a:extLst>
-          </p:cNvPr>
-          <p:cNvPicPr>
-            <a:picLocks noChangeAspect="1"/>
-          </p:cNvPicPr>
-          <p:nvPr/>
-        </p:nvPicPr>
-        <p:blipFill>
-          <a:blip r:embed="rId2"/>
-          <a:stretch>
-            <a:fillRect/>
-          </a:stretch>
-        </p:blipFill>
-        <p:spPr>
-          <a:xfrm>
-            <a:off x="767671" y="1881963"/>
-            <a:ext cx="10388009" cy="4444852"/>
-          </a:xfrm>
-          <a:prstGeom prst="rect">
-            <a:avLst/>
-          </a:prstGeom>
-        </p:spPr>
-      </p:pic>
-    </p:spTree>
-    <p:extLst>
-      <p:ext uri="{BB962C8B-B14F-4D97-AF65-F5344CB8AC3E}">
-        <p14:creationId xmlns:p14="http://schemas.microsoft.com/office/powerpoint/2010/main" val="438335857"/>
-      </p:ext>
-    </p:extLst>
-  </p:cSld>
-  <p:clrMapOvr>
-    <a:masterClrMapping/>
-  </p:clrMapOvr>
-</p:sld>
-</file>
-
-<file path=ppt/slides/slide11.xml><?xml version="1.0" encoding="utf-8"?>
-<p:sld xmlns:a="http://schemas.openxmlformats.org/drawingml/2006/main" xmlns:r="http://schemas.openxmlformats.org/officeDocument/2006/relationships" xmlns:p="http://schemas.openxmlformats.org/presentationml/2006/main">
-  <p:cSld>
-    <p:spTree>
-      <p:nvGrpSpPr>
-        <p:cNvPr id="1" name=""/>
-        <p:cNvGrpSpPr/>
-        <p:nvPr/>
-      </p:nvGrpSpPr>
-      <p:grpSpPr>
-        <a:xfrm>
-          <a:off x="0" y="0"/>
-          <a:ext cx="0" cy="0"/>
-          <a:chOff x="0" y="0"/>
-          <a:chExt cx="0" cy="0"/>
-        </a:xfrm>
-      </p:grpSpPr>
-      <p:sp>
-        <p:nvSpPr>
-          <p:cNvPr id="2" name="Title 1">
-            <a:extLst>
-              <a:ext uri="{FF2B5EF4-FFF2-40B4-BE49-F238E27FC236}">
                 <a16:creationId xmlns:a16="http://schemas.microsoft.com/office/drawing/2014/main" id="{7CB391DB-8F40-473E-8FBE-36B1134DEA0F}"/>
               </a:ext>
             </a:extLst>
@@ -4226,7 +4139,7 @@
 </p:sld>
 </file>
 
-<file path=ppt/slides/slide12.xml><?xml version="1.0" encoding="utf-8"?>
+<file path=ppt/slides/slide11.xml><?xml version="1.0" encoding="utf-8"?>
 <p:sld xmlns:a="http://schemas.openxmlformats.org/drawingml/2006/main" xmlns:r="http://schemas.openxmlformats.org/officeDocument/2006/relationships" xmlns:p="http://schemas.openxmlformats.org/presentationml/2006/main">
   <p:cSld>
     <p:spTree>
@@ -4314,7 +4227,7 @@
 </p:sld>
 </file>
 
-<file path=ppt/slides/slide13.xml><?xml version="1.0" encoding="utf-8"?>
+<file path=ppt/slides/slide12.xml><?xml version="1.0" encoding="utf-8"?>
 <p:sld xmlns:a="http://schemas.openxmlformats.org/drawingml/2006/main" xmlns:r="http://schemas.openxmlformats.org/officeDocument/2006/relationships" xmlns:p="http://schemas.openxmlformats.org/presentationml/2006/main">
   <p:cSld>
     <p:spTree>
@@ -4445,6 +4358,246 @@
     <p:extLst>
       <p:ext uri="{BB962C8B-B14F-4D97-AF65-F5344CB8AC3E}">
         <p14:creationId xmlns:p14="http://schemas.microsoft.com/office/powerpoint/2010/main" val="799214924"/>
+      </p:ext>
+    </p:extLst>
+  </p:cSld>
+  <p:clrMapOvr>
+    <a:masterClrMapping/>
+  </p:clrMapOvr>
+</p:sld>
+</file>
+
+<file path=ppt/slides/slide13.xml><?xml version="1.0" encoding="utf-8"?>
+<p:sld xmlns:a="http://schemas.openxmlformats.org/drawingml/2006/main" xmlns:r="http://schemas.openxmlformats.org/officeDocument/2006/relationships" xmlns:p="http://schemas.openxmlformats.org/presentationml/2006/main">
+  <p:cSld>
+    <p:spTree>
+      <p:nvGrpSpPr>
+        <p:cNvPr id="1" name=""/>
+        <p:cNvGrpSpPr/>
+        <p:nvPr/>
+      </p:nvGrpSpPr>
+      <p:grpSpPr>
+        <a:xfrm>
+          <a:off x="0" y="0"/>
+          <a:ext cx="0" cy="0"/>
+          <a:chOff x="0" y="0"/>
+          <a:chExt cx="0" cy="0"/>
+        </a:xfrm>
+      </p:grpSpPr>
+      <p:sp>
+        <p:nvSpPr>
+          <p:cNvPr id="2" name="Title 1">
+            <a:extLst>
+              <a:ext uri="{FF2B5EF4-FFF2-40B4-BE49-F238E27FC236}">
+                <a16:creationId xmlns:a16="http://schemas.microsoft.com/office/drawing/2014/main" id="{E7663317-2A1B-404C-B450-F90B37D5E3C1}"/>
+              </a:ext>
+            </a:extLst>
+          </p:cNvPr>
+          <p:cNvSpPr>
+            <a:spLocks noGrp="1"/>
+          </p:cNvSpPr>
+          <p:nvPr>
+            <p:ph type="title"/>
+          </p:nvPr>
+        </p:nvSpPr>
+        <p:spPr/>
+        <p:txBody>
+          <a:bodyPr/>
+          <a:lstStyle/>
+          <a:p>
+            <a:r>
+              <a:rPr lang="en-US" dirty="0"/>
+              <a:t>Conclusion</a:t>
+            </a:r>
+          </a:p>
+        </p:txBody>
+      </p:sp>
+      <p:sp>
+        <p:nvSpPr>
+          <p:cNvPr id="3" name="Content Placeholder 2">
+            <a:extLst>
+              <a:ext uri="{FF2B5EF4-FFF2-40B4-BE49-F238E27FC236}">
+                <a16:creationId xmlns:a16="http://schemas.microsoft.com/office/drawing/2014/main" id="{0937BF9F-4712-4E1F-9E09-FC5850BD87A0}"/>
+              </a:ext>
+            </a:extLst>
+          </p:cNvPr>
+          <p:cNvSpPr>
+            <a:spLocks noGrp="1"/>
+          </p:cNvSpPr>
+          <p:nvPr>
+            <p:ph idx="1"/>
+          </p:nvPr>
+        </p:nvSpPr>
+        <p:spPr/>
+        <p:txBody>
+          <a:bodyPr/>
+          <a:lstStyle/>
+          <a:p>
+            <a:pPr>
+              <a:buFont typeface="Wingdings" panose="05000000000000000000" pitchFamily="2" charset="2"/>
+              <a:buChar char="§"/>
+            </a:pPr>
+            <a:r>
+              <a:rPr lang="en-US" dirty="0"/>
+              <a:t>Based on the analysis it looks like “New York City” population tops the list.</a:t>
+            </a:r>
+          </a:p>
+          <a:p>
+            <a:pPr>
+              <a:buFont typeface="Wingdings" panose="05000000000000000000" pitchFamily="2" charset="2"/>
+              <a:buChar char="§"/>
+            </a:pPr>
+            <a:r>
+              <a:rPr lang="en-US" dirty="0"/>
+              <a:t>With respect to the “No of reported crimes” in “New York City” and its “Population” crime rate seems to be lesser compared to other cities.</a:t>
+            </a:r>
+          </a:p>
+          <a:p>
+            <a:pPr>
+              <a:buFont typeface="Wingdings" panose="05000000000000000000" pitchFamily="2" charset="2"/>
+              <a:buChar char="§"/>
+            </a:pPr>
+            <a:r>
+              <a:rPr lang="en-US" dirty="0"/>
+              <a:t>Customer can choose “New York City” as their new venue location.</a:t>
+            </a:r>
+          </a:p>
+          <a:p>
+            <a:pPr>
+              <a:buFont typeface="Wingdings" panose="05000000000000000000" pitchFamily="2" charset="2"/>
+              <a:buChar char="§"/>
+            </a:pPr>
+            <a:r>
+              <a:rPr lang="en-US" dirty="0"/>
+              <a:t>We have identified the “Densely populated” restaurant locations in “New York City” via map.</a:t>
+            </a:r>
+          </a:p>
+          <a:p>
+            <a:pPr>
+              <a:buFont typeface="Wingdings" panose="05000000000000000000" pitchFamily="2" charset="2"/>
+              <a:buChar char="§"/>
+            </a:pPr>
+            <a:r>
+              <a:rPr lang="en-US" dirty="0"/>
+              <a:t>Customer can use this map to locate their strategic location.</a:t>
+            </a:r>
+          </a:p>
+        </p:txBody>
+      </p:sp>
+    </p:spTree>
+    <p:extLst>
+      <p:ext uri="{BB962C8B-B14F-4D97-AF65-F5344CB8AC3E}">
+        <p14:creationId xmlns:p14="http://schemas.microsoft.com/office/powerpoint/2010/main" val="3445579139"/>
+      </p:ext>
+    </p:extLst>
+  </p:cSld>
+  <p:clrMapOvr>
+    <a:masterClrMapping/>
+  </p:clrMapOvr>
+</p:sld>
+</file>
+
+<file path=ppt/slides/slide14.xml><?xml version="1.0" encoding="utf-8"?>
+<p:sld xmlns:a="http://schemas.openxmlformats.org/drawingml/2006/main" xmlns:r="http://schemas.openxmlformats.org/officeDocument/2006/relationships" xmlns:p="http://schemas.openxmlformats.org/presentationml/2006/main">
+  <p:cSld>
+    <p:spTree>
+      <p:nvGrpSpPr>
+        <p:cNvPr id="1" name=""/>
+        <p:cNvGrpSpPr/>
+        <p:nvPr/>
+      </p:nvGrpSpPr>
+      <p:grpSpPr>
+        <a:xfrm>
+          <a:off x="0" y="0"/>
+          <a:ext cx="0" cy="0"/>
+          <a:chOff x="0" y="0"/>
+          <a:chExt cx="0" cy="0"/>
+        </a:xfrm>
+      </p:grpSpPr>
+      <p:sp>
+        <p:nvSpPr>
+          <p:cNvPr id="2" name="Title 1">
+            <a:extLst>
+              <a:ext uri="{FF2B5EF4-FFF2-40B4-BE49-F238E27FC236}">
+                <a16:creationId xmlns:a16="http://schemas.microsoft.com/office/drawing/2014/main" id="{CD956A0F-E7D0-49D3-9D90-204EF7BDFCC1}"/>
+              </a:ext>
+            </a:extLst>
+          </p:cNvPr>
+          <p:cNvSpPr>
+            <a:spLocks noGrp="1"/>
+          </p:cNvSpPr>
+          <p:nvPr>
+            <p:ph type="title"/>
+          </p:nvPr>
+        </p:nvSpPr>
+        <p:spPr/>
+        <p:txBody>
+          <a:bodyPr/>
+          <a:lstStyle/>
+          <a:p>
+            <a:r>
+              <a:rPr lang="en-US" dirty="0"/>
+              <a:t>Future Scope</a:t>
+            </a:r>
+          </a:p>
+        </p:txBody>
+      </p:sp>
+      <p:sp>
+        <p:nvSpPr>
+          <p:cNvPr id="3" name="Content Placeholder 2">
+            <a:extLst>
+              <a:ext uri="{FF2B5EF4-FFF2-40B4-BE49-F238E27FC236}">
+                <a16:creationId xmlns:a16="http://schemas.microsoft.com/office/drawing/2014/main" id="{17AE813B-5D7B-41CC-B261-BCD67E75E19E}"/>
+              </a:ext>
+            </a:extLst>
+          </p:cNvPr>
+          <p:cNvSpPr>
+            <a:spLocks noGrp="1"/>
+          </p:cNvSpPr>
+          <p:nvPr>
+            <p:ph idx="1"/>
+          </p:nvPr>
+        </p:nvSpPr>
+        <p:spPr/>
+        <p:txBody>
+          <a:bodyPr/>
+          <a:lstStyle/>
+          <a:p>
+            <a:pPr>
+              <a:buFont typeface="Wingdings" panose="05000000000000000000" pitchFamily="2" charset="2"/>
+              <a:buChar char="§"/>
+            </a:pPr>
+            <a:r>
+              <a:rPr lang="en-US" dirty="0"/>
+              <a:t>Collect more info on the different categories of restaurant in the “New York Location”</a:t>
+            </a:r>
+          </a:p>
+          <a:p>
+            <a:pPr>
+              <a:buFont typeface="Wingdings" panose="05000000000000000000" pitchFamily="2" charset="2"/>
+              <a:buChar char="§"/>
+            </a:pPr>
+            <a:r>
+              <a:rPr lang="en-US" dirty="0"/>
+              <a:t>Identify the most famous / trending restaurant category in the “New York Location”</a:t>
+            </a:r>
+          </a:p>
+          <a:p>
+            <a:pPr>
+              <a:buFont typeface="Wingdings" panose="05000000000000000000" pitchFamily="2" charset="2"/>
+              <a:buChar char="§"/>
+            </a:pPr>
+            <a:r>
+              <a:rPr lang="en-US" dirty="0"/>
+              <a:t>Based on the “Visual Output” identify a location to open a new restaurant where it doesn’t exist now near the “Trending Places”</a:t>
+            </a:r>
+          </a:p>
+        </p:txBody>
+      </p:sp>
+    </p:spTree>
+    <p:extLst>
+      <p:ext uri="{BB962C8B-B14F-4D97-AF65-F5344CB8AC3E}">
+        <p14:creationId xmlns:p14="http://schemas.microsoft.com/office/powerpoint/2010/main" val="3315473200"/>
       </p:ext>
     </p:extLst>
   </p:cSld>
@@ -4884,7 +5037,12 @@
             <p:ph type="title"/>
           </p:nvPr>
         </p:nvSpPr>
-        <p:spPr/>
+        <p:spPr>
+          <a:xfrm>
+            <a:off x="1097280" y="263529"/>
+            <a:ext cx="10058400" cy="1450757"/>
+          </a:xfrm>
+        </p:spPr>
         <p:txBody>
           <a:bodyPr/>
           <a:lstStyle/>
@@ -4914,7 +5072,9 @@
         </p:nvSpPr>
         <p:spPr/>
         <p:txBody>
-          <a:bodyPr/>
+          <a:bodyPr>
+            <a:normAutofit/>
+          </a:bodyPr>
           <a:lstStyle/>
           <a:p>
             <a:pPr>
@@ -4923,7 +5083,15 @@
             </a:pPr>
             <a:r>
               <a:rPr lang="en-US" dirty="0"/>
-              <a:t> Select the top 10 cities based on population</a:t>
+              <a:t> Clean the data by filtering out unwanted columns and filling up “</a:t>
+            </a:r>
+            <a:r>
+              <a:rPr lang="en-US" dirty="0" err="1"/>
+              <a:t>NaN</a:t>
+            </a:r>
+            <a:r>
+              <a:rPr lang="en-US" dirty="0"/>
+              <a:t>” values. </a:t>
             </a:r>
           </a:p>
           <a:p>
@@ -4933,7 +5101,7 @@
             </a:pPr>
             <a:r>
               <a:rPr lang="en-US" dirty="0"/>
-              <a:t>Map the crime rate with respect to the cities.</a:t>
+              <a:t> Normalize the values so that it can be visually represented in the similar scale. </a:t>
             </a:r>
           </a:p>
           <a:p>
@@ -4943,7 +5111,47 @@
             </a:pPr>
             <a:r>
               <a:rPr lang="en-US" dirty="0"/>
-              <a:t>Select the right city with low crime rate and good enough population.</a:t>
+              <a:t> Arrange the columns based on “Population” (Descending order)</a:t>
+            </a:r>
+          </a:p>
+          <a:p>
+            <a:pPr>
+              <a:buFont typeface="Wingdings" panose="05000000000000000000" pitchFamily="2" charset="2"/>
+              <a:buChar char="§"/>
+            </a:pPr>
+            <a:r>
+              <a:rPr lang="en-US" dirty="0"/>
+              <a:t> Map the top cities with population against the crime rate per 1000 </a:t>
+            </a:r>
+          </a:p>
+          <a:p>
+            <a:pPr>
+              <a:buFont typeface="Wingdings" panose="05000000000000000000" pitchFamily="2" charset="2"/>
+              <a:buChar char="§"/>
+            </a:pPr>
+            <a:r>
+              <a:rPr lang="en-US" dirty="0"/>
+              <a:t> Map the crime rate with respect to the cities.</a:t>
+            </a:r>
+          </a:p>
+          <a:p>
+            <a:pPr>
+              <a:buFont typeface="Wingdings" panose="05000000000000000000" pitchFamily="2" charset="2"/>
+              <a:buChar char="§"/>
+            </a:pPr>
+            <a:r>
+              <a:rPr lang="en-US" dirty="0"/>
+              <a:t> Choose the top 10 cities with highest population</a:t>
+            </a:r>
+          </a:p>
+          <a:p>
+            <a:pPr>
+              <a:buFont typeface="Wingdings" panose="05000000000000000000" pitchFamily="2" charset="2"/>
+              <a:buChar char="§"/>
+            </a:pPr>
+            <a:r>
+              <a:rPr lang="en-US" dirty="0"/>
+              <a:t> Select the right city with low crime rate and good enough population.</a:t>
             </a:r>
           </a:p>
         </p:txBody>
@@ -5033,7 +5241,7 @@
             </a:pPr>
             <a:r>
               <a:rPr lang="en-US" dirty="0"/>
-              <a:t>Using Four Square API explore the chosen city with nearby restaurants.</a:t>
+              <a:t> Using Four Square API explore the chosen city with nearby restaurants.</a:t>
             </a:r>
           </a:p>
           <a:p>
@@ -5043,7 +5251,7 @@
             </a:pPr>
             <a:r>
               <a:rPr lang="en-US" dirty="0"/>
-              <a:t>Visualize the restaurant locations.</a:t>
+              <a:t> Visualize the restaurant locations.</a:t>
             </a:r>
           </a:p>
         </p:txBody>
@@ -5347,7 +5555,7 @@
           <p:cNvPr id="2" name="Title 1">
             <a:extLst>
               <a:ext uri="{FF2B5EF4-FFF2-40B4-BE49-F238E27FC236}">
-                <a16:creationId xmlns:a16="http://schemas.microsoft.com/office/drawing/2014/main" id="{A7C57B77-2915-4D05-A9C7-B54816E7D349}"/>
+                <a16:creationId xmlns:a16="http://schemas.microsoft.com/office/drawing/2014/main" id="{2074BD20-C9C5-4E61-879C-43C2B681A8E5}"/>
               </a:ext>
             </a:extLst>
           </p:cNvPr>
@@ -5365,85 +5573,45 @@
           <a:p>
             <a:r>
               <a:rPr lang="en-US" dirty="0"/>
-              <a:t>Data Clean Up</a:t>
-            </a:r>
-          </a:p>
-        </p:txBody>
-      </p:sp>
-      <p:sp>
-        <p:nvSpPr>
-          <p:cNvPr id="3" name="Content Placeholder 2">
-            <a:extLst>
-              <a:ext uri="{FF2B5EF4-FFF2-40B4-BE49-F238E27FC236}">
-                <a16:creationId xmlns:a16="http://schemas.microsoft.com/office/drawing/2014/main" id="{BECC53C9-3A6F-48CD-84A5-BA51CBA00FB7}"/>
-              </a:ext>
-            </a:extLst>
-          </p:cNvPr>
-          <p:cNvSpPr>
-            <a:spLocks noGrp="1"/>
-          </p:cNvSpPr>
-          <p:nvPr>
-            <p:ph idx="1"/>
-          </p:nvPr>
-        </p:nvSpPr>
-        <p:spPr/>
-        <p:txBody>
-          <a:bodyPr/>
-          <a:lstStyle/>
-          <a:p>
-            <a:pPr>
-              <a:buFont typeface="Wingdings" panose="05000000000000000000" pitchFamily="2" charset="2"/>
-              <a:buChar char="§"/>
-            </a:pPr>
-            <a:r>
-              <a:rPr lang="en-US" dirty="0"/>
-              <a:t>Fill “</a:t>
-            </a:r>
-            <a:r>
-              <a:rPr lang="en-US" dirty="0" err="1"/>
-              <a:t>NaN</a:t>
-            </a:r>
-            <a:r>
-              <a:rPr lang="en-US" dirty="0"/>
-              <a:t>” values with “0” – As they cannot be used for representation.</a:t>
-            </a:r>
-          </a:p>
-          <a:p>
-            <a:pPr>
-              <a:buFont typeface="Wingdings" panose="05000000000000000000" pitchFamily="2" charset="2"/>
-              <a:buChar char="§"/>
-            </a:pPr>
-            <a:r>
-              <a:rPr lang="en-US" dirty="0"/>
-              <a:t>Arrange the columns based on “Population” (Descending order)</a:t>
-            </a:r>
-          </a:p>
-          <a:p>
-            <a:pPr>
-              <a:buFont typeface="Wingdings" panose="05000000000000000000" pitchFamily="2" charset="2"/>
-              <a:buChar char="§"/>
-            </a:pPr>
-            <a:r>
-              <a:rPr lang="en-US" dirty="0"/>
-              <a:t>Choose the top 10 cities with highest population</a:t>
-            </a:r>
-          </a:p>
-          <a:p>
-            <a:pPr>
-              <a:buFont typeface="Wingdings" panose="05000000000000000000" pitchFamily="2" charset="2"/>
-              <a:buChar char="§"/>
-            </a:pPr>
-            <a:r>
-              <a:rPr lang="en-US" dirty="0"/>
-              <a:t>Map the top cities with population against the crime rate per 1000</a:t>
-            </a:r>
-          </a:p>
-        </p:txBody>
-      </p:sp>
+              <a:t>Data Visualization</a:t>
+            </a:r>
+          </a:p>
+        </p:txBody>
+      </p:sp>
+      <p:pic>
+        <p:nvPicPr>
+          <p:cNvPr id="4" name="Picture 3">
+            <a:extLst>
+              <a:ext uri="{FF2B5EF4-FFF2-40B4-BE49-F238E27FC236}">
+                <a16:creationId xmlns:a16="http://schemas.microsoft.com/office/drawing/2014/main" id="{E47BB1ED-014F-4E02-B58B-841EA6A490C4}"/>
+              </a:ext>
+            </a:extLst>
+          </p:cNvPr>
+          <p:cNvPicPr>
+            <a:picLocks noChangeAspect="1"/>
+          </p:cNvPicPr>
+          <p:nvPr/>
+        </p:nvPicPr>
+        <p:blipFill>
+          <a:blip r:embed="rId2"/>
+          <a:stretch>
+            <a:fillRect/>
+          </a:stretch>
+        </p:blipFill>
+        <p:spPr>
+          <a:xfrm>
+            <a:off x="767671" y="1881963"/>
+            <a:ext cx="10388009" cy="4444852"/>
+          </a:xfrm>
+          <a:prstGeom prst="rect">
+            <a:avLst/>
+          </a:prstGeom>
+        </p:spPr>
+      </p:pic>
     </p:spTree>
     <p:extLst>
       <p:ext uri="{BB962C8B-B14F-4D97-AF65-F5344CB8AC3E}">
-        <p14:creationId xmlns:p14="http://schemas.microsoft.com/office/powerpoint/2010/main" val="2087689496"/>
+        <p14:creationId xmlns:p14="http://schemas.microsoft.com/office/powerpoint/2010/main" val="438335857"/>
       </p:ext>
     </p:extLst>
   </p:cSld>

</xml_diff>

<commit_message>
Added pdf report for ease
</commit_message>
<xml_diff>
--- a/IBM_CapstoneProject.pptx
+++ b/IBM_CapstoneProject.pptx
@@ -10,15 +10,16 @@
     <p:sldId id="260" r:id="rId4"/>
     <p:sldId id="261" r:id="rId5"/>
     <p:sldId id="262" r:id="rId6"/>
-    <p:sldId id="263" r:id="rId7"/>
-    <p:sldId id="264" r:id="rId8"/>
-    <p:sldId id="265" r:id="rId9"/>
-    <p:sldId id="266" r:id="rId10"/>
+    <p:sldId id="264" r:id="rId7"/>
+    <p:sldId id="265" r:id="rId8"/>
+    <p:sldId id="266" r:id="rId9"/>
+    <p:sldId id="263" r:id="rId10"/>
     <p:sldId id="268" r:id="rId11"/>
     <p:sldId id="269" r:id="rId12"/>
-    <p:sldId id="270" r:id="rId13"/>
-    <p:sldId id="271" r:id="rId14"/>
-    <p:sldId id="272" r:id="rId15"/>
+    <p:sldId id="273" r:id="rId13"/>
+    <p:sldId id="270" r:id="rId14"/>
+    <p:sldId id="271" r:id="rId15"/>
+    <p:sldId id="272" r:id="rId16"/>
   </p:sldIdLst>
   <p:sldSz cx="12192000" cy="6858000"/>
   <p:notesSz cx="6858000" cy="9144000"/>
@@ -4249,7 +4250,7 @@
           <p:cNvPr id="2" name="Title 1">
             <a:extLst>
               <a:ext uri="{FF2B5EF4-FFF2-40B4-BE49-F238E27FC236}">
-                <a16:creationId xmlns:a16="http://schemas.microsoft.com/office/drawing/2014/main" id="{442D2D41-FDD7-4A07-A245-D9F1610AF58F}"/>
+                <a16:creationId xmlns:a16="http://schemas.microsoft.com/office/drawing/2014/main" id="{B7444C6A-869B-45B7-9789-6CEC2629D313}"/>
               </a:ext>
             </a:extLst>
           </p:cNvPr>
@@ -4267,97 +4268,88 @@
           <a:p>
             <a:r>
               <a:rPr lang="en-US" dirty="0"/>
-              <a:t>Visualizing the cleaned-up data</a:t>
-            </a:r>
-          </a:p>
-        </p:txBody>
-      </p:sp>
-      <p:pic>
-        <p:nvPicPr>
-          <p:cNvPr id="4" name="Picture 3">
-            <a:extLst>
-              <a:ext uri="{FF2B5EF4-FFF2-40B4-BE49-F238E27FC236}">
-                <a16:creationId xmlns:a16="http://schemas.microsoft.com/office/drawing/2014/main" id="{EACD8666-3021-48B1-BBF7-B11477792B28}"/>
-              </a:ext>
-            </a:extLst>
-          </p:cNvPr>
-          <p:cNvPicPr>
-            <a:picLocks noChangeAspect="1"/>
-          </p:cNvPicPr>
-          <p:nvPr/>
-        </p:nvPicPr>
-        <p:blipFill>
-          <a:blip r:embed="rId2"/>
-          <a:stretch>
-            <a:fillRect/>
-          </a:stretch>
-        </p:blipFill>
-        <p:spPr>
-          <a:xfrm>
-            <a:off x="1097280" y="1985972"/>
-            <a:ext cx="5891434" cy="4257378"/>
-          </a:xfrm>
-          <a:prstGeom prst="rect">
-            <a:avLst/>
-          </a:prstGeom>
-        </p:spPr>
-      </p:pic>
-      <p:sp>
-        <p:nvSpPr>
-          <p:cNvPr id="5" name="TextBox 4">
-            <a:extLst>
-              <a:ext uri="{FF2B5EF4-FFF2-40B4-BE49-F238E27FC236}">
-                <a16:creationId xmlns:a16="http://schemas.microsoft.com/office/drawing/2014/main" id="{7A36BD5A-839C-4196-A3B2-0237CB9BCFE7}"/>
-              </a:ext>
-            </a:extLst>
-          </p:cNvPr>
-          <p:cNvSpPr txBox="1"/>
-          <p:nvPr/>
-        </p:nvSpPr>
-        <p:spPr>
-          <a:xfrm>
-            <a:off x="7559749" y="2158409"/>
-            <a:ext cx="4104167" cy="1754326"/>
-          </a:xfrm>
-          <a:prstGeom prst="rect">
-            <a:avLst/>
-          </a:prstGeom>
-          <a:noFill/>
-        </p:spPr>
-        <p:txBody>
-          <a:bodyPr wrap="square" rtlCol="0">
-            <a:spAutoFit/>
-          </a:bodyPr>
-          <a:lstStyle/>
-          <a:p>
-            <a:pPr marL="285750" indent="-285750">
+              <a:t>Clean the data</a:t>
+            </a:r>
+          </a:p>
+        </p:txBody>
+      </p:sp>
+      <p:sp>
+        <p:nvSpPr>
+          <p:cNvPr id="3" name="Content Placeholder 2">
+            <a:extLst>
+              <a:ext uri="{FF2B5EF4-FFF2-40B4-BE49-F238E27FC236}">
+                <a16:creationId xmlns:a16="http://schemas.microsoft.com/office/drawing/2014/main" id="{646A7492-7FDB-4BFA-9125-FA0EE30942CA}"/>
+              </a:ext>
+            </a:extLst>
+          </p:cNvPr>
+          <p:cNvSpPr>
+            <a:spLocks noGrp="1"/>
+          </p:cNvSpPr>
+          <p:nvPr>
+            <p:ph idx="1"/>
+          </p:nvPr>
+        </p:nvSpPr>
+        <p:spPr/>
+        <p:txBody>
+          <a:bodyPr/>
+          <a:lstStyle/>
+          <a:p>
+            <a:pPr>
               <a:buFont typeface="Wingdings" panose="05000000000000000000" pitchFamily="2" charset="2"/>
               <a:buChar char="§"/>
             </a:pPr>
             <a:r>
               <a:rPr lang="en-US" dirty="0"/>
-              <a:t>Total of 30 restaurants are located near the chosen location.</a:t>
-            </a:r>
-          </a:p>
-          <a:p>
-            <a:endParaRPr lang="en-US" dirty="0"/>
-          </a:p>
-          <a:p>
-            <a:pPr marL="285750" indent="-285750">
+              <a:t>Choose the specific columns of the JSON data</a:t>
+            </a:r>
+          </a:p>
+          <a:p>
+            <a:pPr lvl="1">
               <a:buFont typeface="Wingdings" panose="05000000000000000000" pitchFamily="2" charset="2"/>
               <a:buChar char="§"/>
             </a:pPr>
             <a:r>
               <a:rPr lang="en-US" dirty="0"/>
-              <a:t>Customer can visualize the output and then select their strategic location.</a:t>
-            </a:r>
+              <a:t>Id</a:t>
+            </a:r>
+          </a:p>
+          <a:p>
+            <a:pPr lvl="1">
+              <a:buFont typeface="Wingdings" panose="05000000000000000000" pitchFamily="2" charset="2"/>
+              <a:buChar char="§"/>
+            </a:pPr>
+            <a:r>
+              <a:rPr lang="en-US" dirty="0"/>
+              <a:t>Name</a:t>
+            </a:r>
+          </a:p>
+          <a:p>
+            <a:pPr lvl="1">
+              <a:buFont typeface="Wingdings" panose="05000000000000000000" pitchFamily="2" charset="2"/>
+              <a:buChar char="§"/>
+            </a:pPr>
+            <a:r>
+              <a:rPr lang="en-US" dirty="0"/>
+              <a:t>Category</a:t>
+            </a:r>
+          </a:p>
+          <a:p>
+            <a:r>
+              <a:rPr lang="en-US" dirty="0"/>
+              <a:t>Create a map around the chosen “Latitude , Longitude” and place the </a:t>
+            </a:r>
+            <a:r>
+              <a:rPr lang="en-US"/>
+              <a:t>“Restaurant Results” on map</a:t>
+            </a:r>
+            <a:endParaRPr lang="en-US" dirty="0"/>
           </a:p>
         </p:txBody>
       </p:sp>
     </p:spTree>
     <p:extLst>
       <p:ext uri="{BB962C8B-B14F-4D97-AF65-F5344CB8AC3E}">
-        <p14:creationId xmlns:p14="http://schemas.microsoft.com/office/powerpoint/2010/main" val="799214924"/>
+        <p14:creationId xmlns:p14="http://schemas.microsoft.com/office/powerpoint/2010/main" val="3879822746"/>
       </p:ext>
     </p:extLst>
   </p:cSld>
@@ -4389,6 +4381,146 @@
           <p:cNvPr id="2" name="Title 1">
             <a:extLst>
               <a:ext uri="{FF2B5EF4-FFF2-40B4-BE49-F238E27FC236}">
+                <a16:creationId xmlns:a16="http://schemas.microsoft.com/office/drawing/2014/main" id="{442D2D41-FDD7-4A07-A245-D9F1610AF58F}"/>
+              </a:ext>
+            </a:extLst>
+          </p:cNvPr>
+          <p:cNvSpPr>
+            <a:spLocks noGrp="1"/>
+          </p:cNvSpPr>
+          <p:nvPr>
+            <p:ph type="title"/>
+          </p:nvPr>
+        </p:nvSpPr>
+        <p:spPr/>
+        <p:txBody>
+          <a:bodyPr/>
+          <a:lstStyle/>
+          <a:p>
+            <a:r>
+              <a:rPr lang="en-US" dirty="0"/>
+              <a:t>Visualizing the cleaned-up data</a:t>
+            </a:r>
+          </a:p>
+        </p:txBody>
+      </p:sp>
+      <p:pic>
+        <p:nvPicPr>
+          <p:cNvPr id="4" name="Picture 3">
+            <a:extLst>
+              <a:ext uri="{FF2B5EF4-FFF2-40B4-BE49-F238E27FC236}">
+                <a16:creationId xmlns:a16="http://schemas.microsoft.com/office/drawing/2014/main" id="{EACD8666-3021-48B1-BBF7-B11477792B28}"/>
+              </a:ext>
+            </a:extLst>
+          </p:cNvPr>
+          <p:cNvPicPr>
+            <a:picLocks noChangeAspect="1"/>
+          </p:cNvPicPr>
+          <p:nvPr/>
+        </p:nvPicPr>
+        <p:blipFill>
+          <a:blip r:embed="rId2"/>
+          <a:stretch>
+            <a:fillRect/>
+          </a:stretch>
+        </p:blipFill>
+        <p:spPr>
+          <a:xfrm>
+            <a:off x="1097280" y="1985972"/>
+            <a:ext cx="5891434" cy="4257378"/>
+          </a:xfrm>
+          <a:prstGeom prst="rect">
+            <a:avLst/>
+          </a:prstGeom>
+        </p:spPr>
+      </p:pic>
+      <p:sp>
+        <p:nvSpPr>
+          <p:cNvPr id="5" name="TextBox 4">
+            <a:extLst>
+              <a:ext uri="{FF2B5EF4-FFF2-40B4-BE49-F238E27FC236}">
+                <a16:creationId xmlns:a16="http://schemas.microsoft.com/office/drawing/2014/main" id="{7A36BD5A-839C-4196-A3B2-0237CB9BCFE7}"/>
+              </a:ext>
+            </a:extLst>
+          </p:cNvPr>
+          <p:cNvSpPr txBox="1"/>
+          <p:nvPr/>
+        </p:nvSpPr>
+        <p:spPr>
+          <a:xfrm>
+            <a:off x="7559749" y="2158409"/>
+            <a:ext cx="4104167" cy="1754326"/>
+          </a:xfrm>
+          <a:prstGeom prst="rect">
+            <a:avLst/>
+          </a:prstGeom>
+          <a:noFill/>
+        </p:spPr>
+        <p:txBody>
+          <a:bodyPr wrap="square" rtlCol="0">
+            <a:spAutoFit/>
+          </a:bodyPr>
+          <a:lstStyle/>
+          <a:p>
+            <a:pPr marL="285750" indent="-285750">
+              <a:buFont typeface="Wingdings" panose="05000000000000000000" pitchFamily="2" charset="2"/>
+              <a:buChar char="§"/>
+            </a:pPr>
+            <a:r>
+              <a:rPr lang="en-US" dirty="0"/>
+              <a:t>Total of 30 restaurants are located near the chosen location.</a:t>
+            </a:r>
+          </a:p>
+          <a:p>
+            <a:endParaRPr lang="en-US" dirty="0"/>
+          </a:p>
+          <a:p>
+            <a:pPr marL="285750" indent="-285750">
+              <a:buFont typeface="Wingdings" panose="05000000000000000000" pitchFamily="2" charset="2"/>
+              <a:buChar char="§"/>
+            </a:pPr>
+            <a:r>
+              <a:rPr lang="en-US" dirty="0"/>
+              <a:t>Customer can visualize the output and then select their strategic location.</a:t>
+            </a:r>
+          </a:p>
+        </p:txBody>
+      </p:sp>
+    </p:spTree>
+    <p:extLst>
+      <p:ext uri="{BB962C8B-B14F-4D97-AF65-F5344CB8AC3E}">
+        <p14:creationId xmlns:p14="http://schemas.microsoft.com/office/powerpoint/2010/main" val="799214924"/>
+      </p:ext>
+    </p:extLst>
+  </p:cSld>
+  <p:clrMapOvr>
+    <a:masterClrMapping/>
+  </p:clrMapOvr>
+</p:sld>
+</file>
+
+<file path=ppt/slides/slide14.xml><?xml version="1.0" encoding="utf-8"?>
+<p:sld xmlns:a="http://schemas.openxmlformats.org/drawingml/2006/main" xmlns:r="http://schemas.openxmlformats.org/officeDocument/2006/relationships" xmlns:p="http://schemas.openxmlformats.org/presentationml/2006/main">
+  <p:cSld>
+    <p:spTree>
+      <p:nvGrpSpPr>
+        <p:cNvPr id="1" name=""/>
+        <p:cNvGrpSpPr/>
+        <p:nvPr/>
+      </p:nvGrpSpPr>
+      <p:grpSpPr>
+        <a:xfrm>
+          <a:off x="0" y="0"/>
+          <a:ext cx="0" cy="0"/>
+          <a:chOff x="0" y="0"/>
+          <a:chExt cx="0" cy="0"/>
+        </a:xfrm>
+      </p:grpSpPr>
+      <p:sp>
+        <p:nvSpPr>
+          <p:cNvPr id="2" name="Title 1">
+            <a:extLst>
+              <a:ext uri="{FF2B5EF4-FFF2-40B4-BE49-F238E27FC236}">
                 <a16:creationId xmlns:a16="http://schemas.microsoft.com/office/drawing/2014/main" id="{E7663317-2A1B-404C-B450-F90B37D5E3C1}"/>
               </a:ext>
             </a:extLst>
@@ -4497,7 +4629,7 @@
 </p:sld>
 </file>
 
-<file path=ppt/slides/slide14.xml><?xml version="1.0" encoding="utf-8"?>
+<file path=ppt/slides/slide15.xml><?xml version="1.0" encoding="utf-8"?>
 <p:sld xmlns:a="http://schemas.openxmlformats.org/drawingml/2006/main" xmlns:r="http://schemas.openxmlformats.org/officeDocument/2006/relationships" xmlns:p="http://schemas.openxmlformats.org/presentationml/2006/main">
   <p:cSld>
     <p:spTree>
@@ -5191,7 +5323,7 @@
           <p:cNvPr id="2" name="Title 1">
             <a:extLst>
               <a:ext uri="{FF2B5EF4-FFF2-40B4-BE49-F238E27FC236}">
-                <a16:creationId xmlns:a16="http://schemas.microsoft.com/office/drawing/2014/main" id="{761B4F03-CF4A-4187-BD58-7FBE454D72A1}"/>
+                <a16:creationId xmlns:a16="http://schemas.microsoft.com/office/drawing/2014/main" id="{F763F487-33EA-4DF7-8942-F337EFB32ED2}"/>
               </a:ext>
             </a:extLst>
           </p:cNvPr>
@@ -5209,49 +5341,76 @@
           <a:p>
             <a:r>
               <a:rPr lang="en-US" dirty="0"/>
-              <a:t>Explore the chosen place</a:t>
-            </a:r>
-          </a:p>
-        </p:txBody>
-      </p:sp>
-      <p:sp>
-        <p:nvSpPr>
-          <p:cNvPr id="3" name="Content Placeholder 2">
-            <a:extLst>
-              <a:ext uri="{FF2B5EF4-FFF2-40B4-BE49-F238E27FC236}">
-                <a16:creationId xmlns:a16="http://schemas.microsoft.com/office/drawing/2014/main" id="{8F840DB1-9488-431E-8B6F-19151A844B1D}"/>
-              </a:ext>
-            </a:extLst>
-          </p:cNvPr>
-          <p:cNvSpPr>
-            <a:spLocks noGrp="1"/>
-          </p:cNvSpPr>
-          <p:nvPr>
-            <p:ph idx="1"/>
-          </p:nvPr>
-        </p:nvSpPr>
-        <p:spPr/>
-        <p:txBody>
-          <a:bodyPr/>
-          <a:lstStyle/>
-          <a:p>
-            <a:pPr>
+              <a:t>Crime Data – Raw Output</a:t>
+            </a:r>
+          </a:p>
+        </p:txBody>
+      </p:sp>
+      <p:pic>
+        <p:nvPicPr>
+          <p:cNvPr id="5" name="Picture 4">
+            <a:extLst>
+              <a:ext uri="{FF2B5EF4-FFF2-40B4-BE49-F238E27FC236}">
+                <a16:creationId xmlns:a16="http://schemas.microsoft.com/office/drawing/2014/main" id="{2D35D35E-C0A4-4AEE-8AAE-E66C714579F0}"/>
+              </a:ext>
+            </a:extLst>
+          </p:cNvPr>
+          <p:cNvPicPr>
+            <a:picLocks noChangeAspect="1"/>
+          </p:cNvPicPr>
+          <p:nvPr/>
+        </p:nvPicPr>
+        <p:blipFill>
+          <a:blip r:embed="rId2"/>
+          <a:stretch>
+            <a:fillRect/>
+          </a:stretch>
+        </p:blipFill>
+        <p:spPr>
+          <a:xfrm>
+            <a:off x="1097280" y="2095611"/>
+            <a:ext cx="5715000" cy="3857625"/>
+          </a:xfrm>
+          <a:prstGeom prst="rect">
+            <a:avLst/>
+          </a:prstGeom>
+        </p:spPr>
+      </p:pic>
+      <p:sp>
+        <p:nvSpPr>
+          <p:cNvPr id="6" name="TextBox 5">
+            <a:extLst>
+              <a:ext uri="{FF2B5EF4-FFF2-40B4-BE49-F238E27FC236}">
+                <a16:creationId xmlns:a16="http://schemas.microsoft.com/office/drawing/2014/main" id="{86260641-6B61-4C4E-A272-7D7F369A091A}"/>
+              </a:ext>
+            </a:extLst>
+          </p:cNvPr>
+          <p:cNvSpPr txBox="1"/>
+          <p:nvPr/>
+        </p:nvSpPr>
+        <p:spPr>
+          <a:xfrm>
+            <a:off x="7634177" y="2658140"/>
+            <a:ext cx="3521503" cy="646331"/>
+          </a:xfrm>
+          <a:prstGeom prst="rect">
+            <a:avLst/>
+          </a:prstGeom>
+          <a:noFill/>
+        </p:spPr>
+        <p:txBody>
+          <a:bodyPr wrap="square" rtlCol="0">
+            <a:spAutoFit/>
+          </a:bodyPr>
+          <a:lstStyle/>
+          <a:p>
+            <a:pPr marL="285750" indent="-285750">
               <a:buFont typeface="Wingdings" panose="05000000000000000000" pitchFamily="2" charset="2"/>
-              <a:buChar char="§"/>
+              <a:buChar char="Ø"/>
             </a:pPr>
             <a:r>
-              <a:rPr lang="en-US" dirty="0"/>
-              <a:t> Using Four Square API explore the chosen city with nearby restaurants.</a:t>
-            </a:r>
-          </a:p>
-          <a:p>
-            <a:pPr>
-              <a:buFont typeface="Wingdings" panose="05000000000000000000" pitchFamily="2" charset="2"/>
-              <a:buChar char="§"/>
-            </a:pPr>
-            <a:r>
-              <a:rPr lang="en-US" dirty="0"/>
-              <a:t> Visualize the restaurant locations.</a:t>
+              <a:rPr lang="en-US" i="1" dirty="0"/>
+              <a:t>Displaying only the columns of interest</a:t>
             </a:r>
           </a:p>
         </p:txBody>
@@ -5259,7 +5418,7 @@
     </p:spTree>
     <p:extLst>
       <p:ext uri="{BB962C8B-B14F-4D97-AF65-F5344CB8AC3E}">
-        <p14:creationId xmlns:p14="http://schemas.microsoft.com/office/powerpoint/2010/main" val="2273126526"/>
+        <p14:creationId xmlns:p14="http://schemas.microsoft.com/office/powerpoint/2010/main" val="835758044"/>
       </p:ext>
     </p:extLst>
   </p:cSld>
@@ -5291,7 +5450,7 @@
           <p:cNvPr id="2" name="Title 1">
             <a:extLst>
               <a:ext uri="{FF2B5EF4-FFF2-40B4-BE49-F238E27FC236}">
-                <a16:creationId xmlns:a16="http://schemas.microsoft.com/office/drawing/2014/main" id="{F763F487-33EA-4DF7-8942-F337EFB32ED2}"/>
+                <a16:creationId xmlns:a16="http://schemas.microsoft.com/office/drawing/2014/main" id="{641DB109-E679-42F6-A452-D5C07AA86610}"/>
               </a:ext>
             </a:extLst>
           </p:cNvPr>
@@ -5309,17 +5468,17 @@
           <a:p>
             <a:r>
               <a:rPr lang="en-US" dirty="0"/>
-              <a:t>Crime Data – Raw Output</a:t>
+              <a:t>Consolidated Crime Rate Output</a:t>
             </a:r>
           </a:p>
         </p:txBody>
       </p:sp>
       <p:pic>
         <p:nvPicPr>
-          <p:cNvPr id="5" name="Picture 4">
-            <a:extLst>
-              <a:ext uri="{FF2B5EF4-FFF2-40B4-BE49-F238E27FC236}">
-                <a16:creationId xmlns:a16="http://schemas.microsoft.com/office/drawing/2014/main" id="{2D35D35E-C0A4-4AEE-8AAE-E66C714579F0}"/>
+          <p:cNvPr id="4" name="Picture 3">
+            <a:extLst>
+              <a:ext uri="{FF2B5EF4-FFF2-40B4-BE49-F238E27FC236}">
+                <a16:creationId xmlns:a16="http://schemas.microsoft.com/office/drawing/2014/main" id="{4D7EA0F9-7108-4751-95A5-56C406089DBC}"/>
               </a:ext>
             </a:extLst>
           </p:cNvPr>
@@ -5336,8 +5495,8 @@
         </p:blipFill>
         <p:spPr>
           <a:xfrm>
-            <a:off x="1097280" y="2095611"/>
-            <a:ext cx="5715000" cy="3857625"/>
+            <a:off x="1097280" y="2332739"/>
+            <a:ext cx="7800975" cy="1809750"/>
           </a:xfrm>
           <a:prstGeom prst="rect">
             <a:avLst/>
@@ -5346,10 +5505,10 @@
       </p:pic>
       <p:sp>
         <p:nvSpPr>
-          <p:cNvPr id="6" name="TextBox 5">
-            <a:extLst>
-              <a:ext uri="{FF2B5EF4-FFF2-40B4-BE49-F238E27FC236}">
-                <a16:creationId xmlns:a16="http://schemas.microsoft.com/office/drawing/2014/main" id="{86260641-6B61-4C4E-A272-7D7F369A091A}"/>
+          <p:cNvPr id="5" name="TextBox 4">
+            <a:extLst>
+              <a:ext uri="{FF2B5EF4-FFF2-40B4-BE49-F238E27FC236}">
+                <a16:creationId xmlns:a16="http://schemas.microsoft.com/office/drawing/2014/main" id="{5C9AF9D5-2905-4FD7-BB5A-17A28DAE66E7}"/>
               </a:ext>
             </a:extLst>
           </p:cNvPr>
@@ -5358,8 +5517,8 @@
         </p:nvSpPr>
         <p:spPr>
           <a:xfrm>
-            <a:off x="7634177" y="2658140"/>
-            <a:ext cx="3521503" cy="646331"/>
+            <a:off x="1509823" y="4827181"/>
+            <a:ext cx="7570382" cy="1200329"/>
           </a:xfrm>
           <a:prstGeom prst="rect">
             <a:avLst/>
@@ -5374,11 +5533,21 @@
           <a:p>
             <a:pPr marL="285750" indent="-285750">
               <a:buFont typeface="Wingdings" panose="05000000000000000000" pitchFamily="2" charset="2"/>
-              <a:buChar char="Ø"/>
+              <a:buChar char="§"/>
             </a:pPr>
             <a:r>
-              <a:rPr lang="en-US" i="1" dirty="0"/>
-              <a:t>Displaying only the columns of interest</a:t>
+              <a:rPr lang="en-US" dirty="0"/>
+              <a:t>We will use the Population &amp; CrimeRatePer1000 columns for visualizing the output.</a:t>
+            </a:r>
+          </a:p>
+          <a:p>
+            <a:pPr marL="285750" indent="-285750">
+              <a:buFont typeface="Wingdings" panose="05000000000000000000" pitchFamily="2" charset="2"/>
+              <a:buChar char="§"/>
+            </a:pPr>
+            <a:r>
+              <a:rPr lang="en-US" dirty="0"/>
+              <a:t>Before visualizing, lets normalize the ‘Population’ column with its “mean” value, for better visual output.</a:t>
             </a:r>
           </a:p>
         </p:txBody>
@@ -5386,7 +5555,7 @@
     </p:spTree>
     <p:extLst>
       <p:ext uri="{BB962C8B-B14F-4D97-AF65-F5344CB8AC3E}">
-        <p14:creationId xmlns:p14="http://schemas.microsoft.com/office/powerpoint/2010/main" val="835758044"/>
+        <p14:creationId xmlns:p14="http://schemas.microsoft.com/office/powerpoint/2010/main" val="1980572294"/>
       </p:ext>
     </p:extLst>
   </p:cSld>
@@ -5418,7 +5587,7 @@
           <p:cNvPr id="2" name="Title 1">
             <a:extLst>
               <a:ext uri="{FF2B5EF4-FFF2-40B4-BE49-F238E27FC236}">
-                <a16:creationId xmlns:a16="http://schemas.microsoft.com/office/drawing/2014/main" id="{641DB109-E679-42F6-A452-D5C07AA86610}"/>
+                <a16:creationId xmlns:a16="http://schemas.microsoft.com/office/drawing/2014/main" id="{2074BD20-C9C5-4E61-879C-43C2B681A8E5}"/>
               </a:ext>
             </a:extLst>
           </p:cNvPr>
@@ -5436,7 +5605,7 @@
           <a:p>
             <a:r>
               <a:rPr lang="en-US" dirty="0"/>
-              <a:t>Consolidated Crime Rate Output</a:t>
+              <a:t>Data Visualization</a:t>
             </a:r>
           </a:p>
         </p:txBody>
@@ -5446,7 +5615,7 @@
           <p:cNvPr id="4" name="Picture 3">
             <a:extLst>
               <a:ext uri="{FF2B5EF4-FFF2-40B4-BE49-F238E27FC236}">
-                <a16:creationId xmlns:a16="http://schemas.microsoft.com/office/drawing/2014/main" id="{4D7EA0F9-7108-4751-95A5-56C406089DBC}"/>
+                <a16:creationId xmlns:a16="http://schemas.microsoft.com/office/drawing/2014/main" id="{E47BB1ED-014F-4E02-B58B-841EA6A490C4}"/>
               </a:ext>
             </a:extLst>
           </p:cNvPr>
@@ -5463,67 +5632,18 @@
         </p:blipFill>
         <p:spPr>
           <a:xfrm>
-            <a:off x="1097280" y="2332739"/>
-            <a:ext cx="7800975" cy="1809750"/>
+            <a:off x="767671" y="1881963"/>
+            <a:ext cx="10388009" cy="4444852"/>
           </a:xfrm>
           <a:prstGeom prst="rect">
             <a:avLst/>
           </a:prstGeom>
         </p:spPr>
       </p:pic>
-      <p:sp>
-        <p:nvSpPr>
-          <p:cNvPr id="5" name="TextBox 4">
-            <a:extLst>
-              <a:ext uri="{FF2B5EF4-FFF2-40B4-BE49-F238E27FC236}">
-                <a16:creationId xmlns:a16="http://schemas.microsoft.com/office/drawing/2014/main" id="{5C9AF9D5-2905-4FD7-BB5A-17A28DAE66E7}"/>
-              </a:ext>
-            </a:extLst>
-          </p:cNvPr>
-          <p:cNvSpPr txBox="1"/>
-          <p:nvPr/>
-        </p:nvSpPr>
-        <p:spPr>
-          <a:xfrm>
-            <a:off x="1509823" y="4827181"/>
-            <a:ext cx="7570382" cy="1200329"/>
-          </a:xfrm>
-          <a:prstGeom prst="rect">
-            <a:avLst/>
-          </a:prstGeom>
-          <a:noFill/>
-        </p:spPr>
-        <p:txBody>
-          <a:bodyPr wrap="square" rtlCol="0">
-            <a:spAutoFit/>
-          </a:bodyPr>
-          <a:lstStyle/>
-          <a:p>
-            <a:pPr marL="285750" indent="-285750">
-              <a:buFont typeface="Wingdings" panose="05000000000000000000" pitchFamily="2" charset="2"/>
-              <a:buChar char="§"/>
-            </a:pPr>
-            <a:r>
-              <a:rPr lang="en-US" dirty="0"/>
-              <a:t>We will use the Population &amp; CrimeRatePer1000 columns for visualizing the output.</a:t>
-            </a:r>
-          </a:p>
-          <a:p>
-            <a:pPr marL="285750" indent="-285750">
-              <a:buFont typeface="Wingdings" panose="05000000000000000000" pitchFamily="2" charset="2"/>
-              <a:buChar char="§"/>
-            </a:pPr>
-            <a:r>
-              <a:rPr lang="en-US" dirty="0"/>
-              <a:t>Before visualizing, lets normalize the ‘Population’ column with its “mean” value, for better visual output.</a:t>
-            </a:r>
-          </a:p>
-        </p:txBody>
-      </p:sp>
     </p:spTree>
     <p:extLst>
       <p:ext uri="{BB962C8B-B14F-4D97-AF65-F5344CB8AC3E}">
-        <p14:creationId xmlns:p14="http://schemas.microsoft.com/office/powerpoint/2010/main" val="1980572294"/>
+        <p14:creationId xmlns:p14="http://schemas.microsoft.com/office/powerpoint/2010/main" val="438335857"/>
       </p:ext>
     </p:extLst>
   </p:cSld>
@@ -5555,7 +5675,7 @@
           <p:cNvPr id="2" name="Title 1">
             <a:extLst>
               <a:ext uri="{FF2B5EF4-FFF2-40B4-BE49-F238E27FC236}">
-                <a16:creationId xmlns:a16="http://schemas.microsoft.com/office/drawing/2014/main" id="{2074BD20-C9C5-4E61-879C-43C2B681A8E5}"/>
+                <a16:creationId xmlns:a16="http://schemas.microsoft.com/office/drawing/2014/main" id="{761B4F03-CF4A-4187-BD58-7FBE454D72A1}"/>
               </a:ext>
             </a:extLst>
           </p:cNvPr>
@@ -5573,45 +5693,57 @@
           <a:p>
             <a:r>
               <a:rPr lang="en-US" dirty="0"/>
-              <a:t>Data Visualization</a:t>
-            </a:r>
-          </a:p>
-        </p:txBody>
-      </p:sp>
-      <p:pic>
-        <p:nvPicPr>
-          <p:cNvPr id="4" name="Picture 3">
-            <a:extLst>
-              <a:ext uri="{FF2B5EF4-FFF2-40B4-BE49-F238E27FC236}">
-                <a16:creationId xmlns:a16="http://schemas.microsoft.com/office/drawing/2014/main" id="{E47BB1ED-014F-4E02-B58B-841EA6A490C4}"/>
-              </a:ext>
-            </a:extLst>
-          </p:cNvPr>
-          <p:cNvPicPr>
-            <a:picLocks noChangeAspect="1"/>
-          </p:cNvPicPr>
-          <p:nvPr/>
-        </p:nvPicPr>
-        <p:blipFill>
-          <a:blip r:embed="rId2"/>
-          <a:stretch>
-            <a:fillRect/>
-          </a:stretch>
-        </p:blipFill>
-        <p:spPr>
-          <a:xfrm>
-            <a:off x="767671" y="1881963"/>
-            <a:ext cx="10388009" cy="4444852"/>
-          </a:xfrm>
-          <a:prstGeom prst="rect">
-            <a:avLst/>
-          </a:prstGeom>
-        </p:spPr>
-      </p:pic>
+              <a:t>Explore the chosen place</a:t>
+            </a:r>
+          </a:p>
+        </p:txBody>
+      </p:sp>
+      <p:sp>
+        <p:nvSpPr>
+          <p:cNvPr id="3" name="Content Placeholder 2">
+            <a:extLst>
+              <a:ext uri="{FF2B5EF4-FFF2-40B4-BE49-F238E27FC236}">
+                <a16:creationId xmlns:a16="http://schemas.microsoft.com/office/drawing/2014/main" id="{8F840DB1-9488-431E-8B6F-19151A844B1D}"/>
+              </a:ext>
+            </a:extLst>
+          </p:cNvPr>
+          <p:cNvSpPr>
+            <a:spLocks noGrp="1"/>
+          </p:cNvSpPr>
+          <p:nvPr>
+            <p:ph idx="1"/>
+          </p:nvPr>
+        </p:nvSpPr>
+        <p:spPr/>
+        <p:txBody>
+          <a:bodyPr/>
+          <a:lstStyle/>
+          <a:p>
+            <a:pPr>
+              <a:buFont typeface="Wingdings" panose="05000000000000000000" pitchFamily="2" charset="2"/>
+              <a:buChar char="§"/>
+            </a:pPr>
+            <a:r>
+              <a:rPr lang="en-US" dirty="0"/>
+              <a:t> Using Four Square API explore the chosen city with nearby restaurants.</a:t>
+            </a:r>
+          </a:p>
+          <a:p>
+            <a:pPr>
+              <a:buFont typeface="Wingdings" panose="05000000000000000000" pitchFamily="2" charset="2"/>
+              <a:buChar char="§"/>
+            </a:pPr>
+            <a:r>
+              <a:rPr lang="en-US" dirty="0"/>
+              <a:t> Visualize the restaurant locations.</a:t>
+            </a:r>
+          </a:p>
+        </p:txBody>
+      </p:sp>
     </p:spTree>
     <p:extLst>
       <p:ext uri="{BB962C8B-B14F-4D97-AF65-F5344CB8AC3E}">
-        <p14:creationId xmlns:p14="http://schemas.microsoft.com/office/powerpoint/2010/main" val="438335857"/>
+        <p14:creationId xmlns:p14="http://schemas.microsoft.com/office/powerpoint/2010/main" val="2011957923"/>
       </p:ext>
     </p:extLst>
   </p:cSld>

</xml_diff>